<commit_message>
Initial input to slides
</commit_message>
<xml_diff>
--- a/Web3D2013-Dec3D/Web3D2013Presentation.pptx
+++ b/Web3D2013-Dec3D/Web3D2013Presentation.pptx
@@ -126,7 +126,7 @@
   </p:defaultTextStyle>
   <p:extLst>
     <p:ext uri="{EFAFB233-063F-42B5-8137-9DF3F51BA10A}">
-      <p15:sldGuideLst xmlns:p15="http://schemas.microsoft.com/office/powerpoint/2012/main">
+      <p15:sldGuideLst xmlns:p15="http://schemas.microsoft.com/office/powerpoint/2012/main" xmlns="">
         <p15:guide id="1" orient="horz" pos="2160">
           <p15:clr>
             <a:srgbClr val="A4A3A4"/>
@@ -140,7 +140,7 @@
       </p15:sldGuideLst>
     </p:ext>
     <p:ext uri="{2D200454-40CA-4A62-9FC3-DE9A4176ACB9}">
-      <p15:notesGuideLst xmlns:p15="http://schemas.microsoft.com/office/powerpoint/2012/main"/>
+      <p15:notesGuideLst xmlns:p15="http://schemas.microsoft.com/office/powerpoint/2012/main" xmlns=""/>
     </p:ext>
   </p:extLst>
 </p:presentation>
@@ -229,7 +229,7 @@
             <a:fld id="{D6322035-7D7D-4458-9192-7BFC7F8F28FB}" type="datetimeFigureOut">
               <a:rPr lang="en-US" smtClean="0"/>
               <a:pPr/>
-              <a:t>6/11/2013</a:t>
+              <a:t>6/19/2013</a:t>
             </a:fld>
             <a:endParaRPr lang="en-US"/>
           </a:p>
@@ -296,7 +296,7 @@
             <a:fld id="{4FAC2626-9701-4336-AB7B-937426DE8CE1}" type="slidenum">
               <a:rPr lang="en-US" smtClean="0"/>
               <a:pPr/>
-              <a:t>‹#›</a:t>
+              <a:t>‹Nr.›</a:t>
             </a:fld>
             <a:endParaRPr lang="en-US"/>
           </a:p>
@@ -305,7 +305,7 @@
     </p:spTree>
     <p:extLst>
       <p:ext uri="{BB962C8B-B14F-4D97-AF65-F5344CB8AC3E}">
-        <p14:creationId xmlns:p14="http://schemas.microsoft.com/office/powerpoint/2010/main" val="3917507118"/>
+        <p14:creationId xmlns:p14="http://schemas.microsoft.com/office/powerpoint/2010/main" xmlns="" val="3917507118"/>
       </p:ext>
     </p:extLst>
   </p:cSld>
@@ -396,7 +396,7 @@
             <a:fld id="{941582D0-2F87-47CB-91DC-E925C3C7CC4D}" type="datetimeFigureOut">
               <a:rPr lang="en-US" smtClean="0"/>
               <a:pPr/>
-              <a:t>6/11/2013</a:t>
+              <a:t>6/19/2013</a:t>
             </a:fld>
             <a:endParaRPr lang="en-US"/>
           </a:p>
@@ -556,7 +556,7 @@
             <a:fld id="{6483879A-ACFB-4F44-BA93-40F2237C1EEC}" type="slidenum">
               <a:rPr lang="en-US" smtClean="0"/>
               <a:pPr/>
-              <a:t>‹#›</a:t>
+              <a:t>‹Nr.›</a:t>
             </a:fld>
             <a:endParaRPr lang="en-US"/>
           </a:p>
@@ -565,7 +565,7 @@
     </p:spTree>
     <p:extLst>
       <p:ext uri="{BB962C8B-B14F-4D97-AF65-F5344CB8AC3E}">
-        <p14:creationId xmlns:p14="http://schemas.microsoft.com/office/powerpoint/2010/main" val="3625258110"/>
+        <p14:creationId xmlns:p14="http://schemas.microsoft.com/office/powerpoint/2010/main" xmlns="" val="3625258110"/>
       </p:ext>
     </p:extLst>
   </p:cSld>
@@ -745,7 +745,7 @@
     </p:spTree>
     <p:extLst>
       <p:ext uri="{BB962C8B-B14F-4D97-AF65-F5344CB8AC3E}">
-        <p14:creationId xmlns:p14="http://schemas.microsoft.com/office/powerpoint/2010/main" val="600426170"/>
+        <p14:creationId xmlns:p14="http://schemas.microsoft.com/office/powerpoint/2010/main" xmlns="" val="600426170"/>
       </p:ext>
     </p:extLst>
   </p:cSld>
@@ -830,7 +830,7 @@
     </p:spTree>
     <p:extLst>
       <p:ext uri="{BB962C8B-B14F-4D97-AF65-F5344CB8AC3E}">
-        <p14:creationId xmlns:p14="http://schemas.microsoft.com/office/powerpoint/2010/main" val="1727202921"/>
+        <p14:creationId xmlns:p14="http://schemas.microsoft.com/office/powerpoint/2010/main" xmlns="" val="1727202921"/>
       </p:ext>
     </p:extLst>
   </p:cSld>
@@ -915,7 +915,7 @@
     </p:spTree>
     <p:extLst>
       <p:ext uri="{BB962C8B-B14F-4D97-AF65-F5344CB8AC3E}">
-        <p14:creationId xmlns:p14="http://schemas.microsoft.com/office/powerpoint/2010/main" val="2405428526"/>
+        <p14:creationId xmlns:p14="http://schemas.microsoft.com/office/powerpoint/2010/main" xmlns="" val="2405428526"/>
       </p:ext>
     </p:extLst>
   </p:cSld>
@@ -1005,7 +1005,7 @@
     </p:spTree>
     <p:extLst>
       <p:ext uri="{BB962C8B-B14F-4D97-AF65-F5344CB8AC3E}">
-        <p14:creationId xmlns:p14="http://schemas.microsoft.com/office/powerpoint/2010/main" val="2089411291"/>
+        <p14:creationId xmlns:p14="http://schemas.microsoft.com/office/powerpoint/2010/main" xmlns="" val="2089411291"/>
       </p:ext>
     </p:extLst>
   </p:cSld>
@@ -1090,7 +1090,7 @@
     </p:spTree>
     <p:extLst>
       <p:ext uri="{BB962C8B-B14F-4D97-AF65-F5344CB8AC3E}">
-        <p14:creationId xmlns:p14="http://schemas.microsoft.com/office/powerpoint/2010/main" val="3107323670"/>
+        <p14:creationId xmlns:p14="http://schemas.microsoft.com/office/powerpoint/2010/main" xmlns="" val="3107323670"/>
       </p:ext>
     </p:extLst>
   </p:cSld>
@@ -1188,7 +1188,7 @@
     </p:spTree>
     <p:extLst>
       <p:ext uri="{BB962C8B-B14F-4D97-AF65-F5344CB8AC3E}">
-        <p14:creationId xmlns:p14="http://schemas.microsoft.com/office/powerpoint/2010/main" val="106924194"/>
+        <p14:creationId xmlns:p14="http://schemas.microsoft.com/office/powerpoint/2010/main" xmlns="" val="106924194"/>
       </p:ext>
     </p:extLst>
   </p:cSld>
@@ -1273,7 +1273,7 @@
     </p:spTree>
     <p:extLst>
       <p:ext uri="{BB962C8B-B14F-4D97-AF65-F5344CB8AC3E}">
-        <p14:creationId xmlns:p14="http://schemas.microsoft.com/office/powerpoint/2010/main" val="3083984785"/>
+        <p14:creationId xmlns:p14="http://schemas.microsoft.com/office/powerpoint/2010/main" xmlns="" val="3083984785"/>
       </p:ext>
     </p:extLst>
   </p:cSld>
@@ -1358,7 +1358,7 @@
     </p:spTree>
     <p:extLst>
       <p:ext uri="{BB962C8B-B14F-4D97-AF65-F5344CB8AC3E}">
-        <p14:creationId xmlns:p14="http://schemas.microsoft.com/office/powerpoint/2010/main" val="3642180973"/>
+        <p14:creationId xmlns:p14="http://schemas.microsoft.com/office/powerpoint/2010/main" xmlns="" val="3642180973"/>
       </p:ext>
     </p:extLst>
   </p:cSld>
@@ -1443,7 +1443,7 @@
     </p:spTree>
     <p:extLst>
       <p:ext uri="{BB962C8B-B14F-4D97-AF65-F5344CB8AC3E}">
-        <p14:creationId xmlns:p14="http://schemas.microsoft.com/office/powerpoint/2010/main" val="2078330808"/>
+        <p14:creationId xmlns:p14="http://schemas.microsoft.com/office/powerpoint/2010/main" xmlns="" val="2078330808"/>
       </p:ext>
     </p:extLst>
   </p:cSld>
@@ -1528,7 +1528,7 @@
     </p:spTree>
     <p:extLst>
       <p:ext uri="{BB962C8B-B14F-4D97-AF65-F5344CB8AC3E}">
-        <p14:creationId xmlns:p14="http://schemas.microsoft.com/office/powerpoint/2010/main" val="2727644080"/>
+        <p14:creationId xmlns:p14="http://schemas.microsoft.com/office/powerpoint/2010/main" xmlns="" val="2727644080"/>
       </p:ext>
     </p:extLst>
   </p:cSld>
@@ -1613,7 +1613,7 @@
     </p:spTree>
     <p:extLst>
       <p:ext uri="{BB962C8B-B14F-4D97-AF65-F5344CB8AC3E}">
-        <p14:creationId xmlns:p14="http://schemas.microsoft.com/office/powerpoint/2010/main" val="1266234494"/>
+        <p14:creationId xmlns:p14="http://schemas.microsoft.com/office/powerpoint/2010/main" xmlns="" val="1266234494"/>
       </p:ext>
     </p:extLst>
   </p:cSld>
@@ -1652,7 +1652,7 @@
           <a:blip r:embed="rId2" cstate="print">
             <a:extLst>
               <a:ext uri="{28A0092B-C50C-407E-A947-70E740481C1C}">
-                <a14:useLocalDpi xmlns:a14="http://schemas.microsoft.com/office/drawing/2010/main" val="0"/>
+                <a14:useLocalDpi xmlns:a14="http://schemas.microsoft.com/office/drawing/2010/main" xmlns="" val="0"/>
               </a:ext>
             </a:extLst>
           </a:blip>
@@ -1831,18 +1831,18 @@
     </p:spTree>
     <p:extLst>
       <p:ext uri="{BB962C8B-B14F-4D97-AF65-F5344CB8AC3E}">
-        <p14:creationId xmlns:p14="http://schemas.microsoft.com/office/powerpoint/2010/main" val="2781634679"/>
+        <p14:creationId xmlns:p14="http://schemas.microsoft.com/office/powerpoint/2010/main" xmlns="" val="2781634679"/>
       </p:ext>
     </p:extLst>
   </p:cSld>
   <p:clrMapOvr>
     <a:masterClrMapping/>
   </p:clrMapOvr>
-  <mc:AlternateContent xmlns:mc="http://schemas.openxmlformats.org/markup-compatibility/2006" xmlns:p14="http://schemas.microsoft.com/office/powerpoint/2010/main">
-    <mc:Choice Requires="p14">
+  <mc:AlternateContent xmlns:mc="http://schemas.openxmlformats.org/markup-compatibility/2006">
+    <mc:Choice xmlns:p14="http://schemas.microsoft.com/office/powerpoint/2010/main" xmlns="" Requires="p14">
       <p:transition p14:dur="0"/>
     </mc:Choice>
-    <mc:Fallback xmlns="">
+    <mc:Fallback>
       <p:transition/>
     </mc:Fallback>
   </mc:AlternateContent>
@@ -1885,7 +1885,7 @@
           <a:blip r:embed="rId2" cstate="print">
             <a:extLst>
               <a:ext uri="{28A0092B-C50C-407E-A947-70E740481C1C}">
-                <a14:useLocalDpi xmlns:a14="http://schemas.microsoft.com/office/drawing/2010/main" val="0"/>
+                <a14:useLocalDpi xmlns:a14="http://schemas.microsoft.com/office/drawing/2010/main" xmlns="" val="0"/>
               </a:ext>
             </a:extLst>
           </a:blip>
@@ -1944,18 +1944,18 @@
     </p:spTree>
     <p:extLst>
       <p:ext uri="{BB962C8B-B14F-4D97-AF65-F5344CB8AC3E}">
-        <p14:creationId xmlns:p14="http://schemas.microsoft.com/office/powerpoint/2010/main" val="3076526567"/>
+        <p14:creationId xmlns:p14="http://schemas.microsoft.com/office/powerpoint/2010/main" xmlns="" val="3076526567"/>
       </p:ext>
     </p:extLst>
   </p:cSld>
   <p:clrMapOvr>
     <a:masterClrMapping/>
   </p:clrMapOvr>
-  <mc:AlternateContent xmlns:mc="http://schemas.openxmlformats.org/markup-compatibility/2006" xmlns:p14="http://schemas.microsoft.com/office/powerpoint/2010/main">
-    <mc:Choice Requires="p14">
+  <mc:AlternateContent xmlns:mc="http://schemas.openxmlformats.org/markup-compatibility/2006">
+    <mc:Choice xmlns:p14="http://schemas.microsoft.com/office/powerpoint/2010/main" xmlns="" Requires="p14">
       <p:transition p14:dur="0"/>
     </mc:Choice>
-    <mc:Fallback xmlns="">
+    <mc:Fallback>
       <p:transition/>
     </mc:Fallback>
   </mc:AlternateContent>
@@ -2064,18 +2064,18 @@
     </p:spTree>
     <p:extLst>
       <p:ext uri="{BB962C8B-B14F-4D97-AF65-F5344CB8AC3E}">
-        <p14:creationId xmlns:p14="http://schemas.microsoft.com/office/powerpoint/2010/main" val="2549443191"/>
+        <p14:creationId xmlns:p14="http://schemas.microsoft.com/office/powerpoint/2010/main" xmlns="" val="2549443191"/>
       </p:ext>
     </p:extLst>
   </p:cSld>
   <p:clrMapOvr>
     <a:masterClrMapping/>
   </p:clrMapOvr>
-  <mc:AlternateContent xmlns:mc="http://schemas.openxmlformats.org/markup-compatibility/2006" xmlns:p14="http://schemas.microsoft.com/office/powerpoint/2010/main">
-    <mc:Choice Requires="p14">
+  <mc:AlternateContent xmlns:mc="http://schemas.openxmlformats.org/markup-compatibility/2006">
+    <mc:Choice xmlns:p14="http://schemas.microsoft.com/office/powerpoint/2010/main" xmlns="" Requires="p14">
       <p:transition p14:dur="0"/>
     </mc:Choice>
-    <mc:Fallback xmlns="">
+    <mc:Fallback>
       <p:transition/>
     </mc:Fallback>
   </mc:AlternateContent>
@@ -2109,18 +2109,18 @@
     </p:spTree>
     <p:extLst>
       <p:ext uri="{BB962C8B-B14F-4D97-AF65-F5344CB8AC3E}">
-        <p14:creationId xmlns:p14="http://schemas.microsoft.com/office/powerpoint/2010/main" val="2203047849"/>
+        <p14:creationId xmlns:p14="http://schemas.microsoft.com/office/powerpoint/2010/main" xmlns="" val="2203047849"/>
       </p:ext>
     </p:extLst>
   </p:cSld>
   <p:clrMapOvr>
     <a:masterClrMapping/>
   </p:clrMapOvr>
-  <mc:AlternateContent xmlns:mc="http://schemas.openxmlformats.org/markup-compatibility/2006" xmlns:p14="http://schemas.microsoft.com/office/powerpoint/2010/main">
-    <mc:Choice Requires="p14">
+  <mc:AlternateContent xmlns:mc="http://schemas.openxmlformats.org/markup-compatibility/2006">
+    <mc:Choice xmlns:p14="http://schemas.microsoft.com/office/powerpoint/2010/main" xmlns="" Requires="p14">
       <p:transition p14:dur="0"/>
     </mc:Choice>
-    <mc:Fallback xmlns="">
+    <mc:Fallback>
       <p:transition/>
     </mc:Fallback>
   </mc:AlternateContent>
@@ -2216,7 +2216,7 @@
           <a:blip r:embed="rId6" cstate="print">
             <a:extLst>
               <a:ext uri="{28A0092B-C50C-407E-A947-70E740481C1C}">
-                <a14:useLocalDpi xmlns:a14="http://schemas.microsoft.com/office/drawing/2010/main" val="0"/>
+                <a14:useLocalDpi xmlns:a14="http://schemas.microsoft.com/office/drawing/2010/main" xmlns="" val="0"/>
               </a:ext>
             </a:extLst>
           </a:blip>
@@ -2512,7 +2512,7 @@
     </p:spTree>
     <p:extLst>
       <p:ext uri="{BB962C8B-B14F-4D97-AF65-F5344CB8AC3E}">
-        <p14:creationId xmlns:p14="http://schemas.microsoft.com/office/powerpoint/2010/main" val="3441083178"/>
+        <p14:creationId xmlns:p14="http://schemas.microsoft.com/office/powerpoint/2010/main" xmlns="" val="3441083178"/>
       </p:ext>
     </p:extLst>
   </p:cSld>
@@ -2523,11 +2523,11 @@
     <p:sldLayoutId id="2147484040" r:id="rId3"/>
     <p:sldLayoutId id="2147484041" r:id="rId4"/>
   </p:sldLayoutIdLst>
-  <mc:AlternateContent xmlns:mc="http://schemas.openxmlformats.org/markup-compatibility/2006" xmlns:p14="http://schemas.microsoft.com/office/powerpoint/2010/main">
-    <mc:Choice Requires="p14">
+  <mc:AlternateContent xmlns:mc="http://schemas.openxmlformats.org/markup-compatibility/2006">
+    <mc:Choice xmlns:p14="http://schemas.microsoft.com/office/powerpoint/2010/main" xmlns="" Requires="p14">
       <p:transition p14:dur="0"/>
     </mc:Choice>
-    <mc:Fallback xmlns="">
+    <mc:Fallback>
       <p:transition/>
     </mc:Fallback>
   </mc:AlternateContent>
@@ -3117,18 +3117,18 @@
     </p:spTree>
     <p:extLst>
       <p:ext uri="{BB962C8B-B14F-4D97-AF65-F5344CB8AC3E}">
-        <p14:creationId xmlns:p14="http://schemas.microsoft.com/office/powerpoint/2010/main" val="1904904095"/>
+        <p14:creationId xmlns:p14="http://schemas.microsoft.com/office/powerpoint/2010/main" xmlns="" val="1904904095"/>
       </p:ext>
     </p:extLst>
   </p:cSld>
   <p:clrMapOvr>
     <a:masterClrMapping/>
   </p:clrMapOvr>
-  <mc:AlternateContent xmlns:mc="http://schemas.openxmlformats.org/markup-compatibility/2006" xmlns:p14="http://schemas.microsoft.com/office/powerpoint/2010/main">
-    <mc:Choice Requires="p14">
+  <mc:AlternateContent xmlns:mc="http://schemas.openxmlformats.org/markup-compatibility/2006">
+    <mc:Choice xmlns:p14="http://schemas.microsoft.com/office/powerpoint/2010/main" xmlns="" Requires="p14">
       <p:transition p14:dur="0"/>
     </mc:Choice>
-    <mc:Fallback xmlns="">
+    <mc:Fallback>
       <p:transition/>
     </mc:Fallback>
   </mc:AlternateContent>
@@ -3307,18 +3307,18 @@
     </p:spTree>
     <p:extLst>
       <p:ext uri="{BB962C8B-B14F-4D97-AF65-F5344CB8AC3E}">
-        <p14:creationId xmlns:p14="http://schemas.microsoft.com/office/powerpoint/2010/main" val="3200889008"/>
+        <p14:creationId xmlns:p14="http://schemas.microsoft.com/office/powerpoint/2010/main" xmlns="" val="3200889008"/>
       </p:ext>
     </p:extLst>
   </p:cSld>
   <p:clrMapOvr>
     <a:masterClrMapping/>
   </p:clrMapOvr>
-  <mc:AlternateContent xmlns:mc="http://schemas.openxmlformats.org/markup-compatibility/2006" xmlns:p14="http://schemas.microsoft.com/office/powerpoint/2010/main">
-    <mc:Choice Requires="p14">
+  <mc:AlternateContent xmlns:mc="http://schemas.openxmlformats.org/markup-compatibility/2006">
+    <mc:Choice xmlns:p14="http://schemas.microsoft.com/office/powerpoint/2010/main" xmlns="" Requires="p14">
       <p:transition p14:dur="0"/>
     </mc:Choice>
-    <mc:Fallback xmlns="">
+    <mc:Fallback>
       <p:transition/>
     </mc:Fallback>
   </mc:AlternateContent>
@@ -3394,7 +3394,7 @@
           <a:blip r:embed="rId3">
             <a:extLst>
               <a:ext uri="{28A0092B-C50C-407E-A947-70E740481C1C}">
-                <a14:useLocalDpi xmlns:a14="http://schemas.microsoft.com/office/drawing/2010/main" val="0"/>
+                <a14:useLocalDpi xmlns:a14="http://schemas.microsoft.com/office/drawing/2010/main" xmlns="" val="0"/>
               </a:ext>
             </a:extLst>
           </a:blip>
@@ -3412,18 +3412,18 @@
     </p:spTree>
     <p:extLst>
       <p:ext uri="{BB962C8B-B14F-4D97-AF65-F5344CB8AC3E}">
-        <p14:creationId xmlns:p14="http://schemas.microsoft.com/office/powerpoint/2010/main" val="922523166"/>
+        <p14:creationId xmlns:p14="http://schemas.microsoft.com/office/powerpoint/2010/main" xmlns="" val="922523166"/>
       </p:ext>
     </p:extLst>
   </p:cSld>
   <p:clrMapOvr>
     <a:masterClrMapping/>
   </p:clrMapOvr>
-  <mc:AlternateContent xmlns:mc="http://schemas.openxmlformats.org/markup-compatibility/2006" xmlns:p14="http://schemas.microsoft.com/office/powerpoint/2010/main">
-    <mc:Choice Requires="p14">
+  <mc:AlternateContent xmlns:mc="http://schemas.openxmlformats.org/markup-compatibility/2006">
+    <mc:Choice xmlns:p14="http://schemas.microsoft.com/office/powerpoint/2010/main" xmlns="" Requires="p14">
       <p:transition p14:dur="0"/>
     </mc:Choice>
-    <mc:Fallback xmlns="">
+    <mc:Fallback>
       <p:transition/>
     </mc:Fallback>
   </mc:AlternateContent>
@@ -3479,18 +3479,18 @@
     </p:spTree>
     <p:extLst>
       <p:ext uri="{BB962C8B-B14F-4D97-AF65-F5344CB8AC3E}">
-        <p14:creationId xmlns:p14="http://schemas.microsoft.com/office/powerpoint/2010/main" val="4102748782"/>
+        <p14:creationId xmlns:p14="http://schemas.microsoft.com/office/powerpoint/2010/main" xmlns="" val="4102748782"/>
       </p:ext>
     </p:extLst>
   </p:cSld>
   <p:clrMapOvr>
     <a:masterClrMapping/>
   </p:clrMapOvr>
-  <mc:AlternateContent xmlns:mc="http://schemas.openxmlformats.org/markup-compatibility/2006" xmlns:p14="http://schemas.microsoft.com/office/powerpoint/2010/main">
-    <mc:Choice Requires="p14">
+  <mc:AlternateContent xmlns:mc="http://schemas.openxmlformats.org/markup-compatibility/2006">
+    <mc:Choice xmlns:p14="http://schemas.microsoft.com/office/powerpoint/2010/main" xmlns="" Requires="p14">
       <p:transition p14:dur="0"/>
     </mc:Choice>
-    <mc:Fallback xmlns="">
+    <mc:Fallback>
       <p:transition/>
     </mc:Fallback>
   </mc:AlternateContent>
@@ -3624,18 +3624,18 @@
     </p:spTree>
     <p:extLst>
       <p:ext uri="{BB962C8B-B14F-4D97-AF65-F5344CB8AC3E}">
-        <p14:creationId xmlns:p14="http://schemas.microsoft.com/office/powerpoint/2010/main" val="997690693"/>
+        <p14:creationId xmlns:p14="http://schemas.microsoft.com/office/powerpoint/2010/main" xmlns="" val="997690693"/>
       </p:ext>
     </p:extLst>
   </p:cSld>
   <p:clrMapOvr>
     <a:masterClrMapping/>
   </p:clrMapOvr>
-  <mc:AlternateContent xmlns:mc="http://schemas.openxmlformats.org/markup-compatibility/2006" xmlns:p14="http://schemas.microsoft.com/office/powerpoint/2010/main">
-    <mc:Choice Requires="p14">
+  <mc:AlternateContent xmlns:mc="http://schemas.openxmlformats.org/markup-compatibility/2006">
+    <mc:Choice xmlns:p14="http://schemas.microsoft.com/office/powerpoint/2010/main" xmlns="" Requires="p14">
       <p:transition p14:dur="0"/>
     </mc:Choice>
-    <mc:Fallback xmlns="">
+    <mc:Fallback>
       <p:transition/>
     </mc:Fallback>
   </mc:AlternateContent>
@@ -3960,18 +3960,18 @@
     </p:spTree>
     <p:extLst>
       <p:ext uri="{BB962C8B-B14F-4D97-AF65-F5344CB8AC3E}">
-        <p14:creationId xmlns:p14="http://schemas.microsoft.com/office/powerpoint/2010/main" val="2874016700"/>
+        <p14:creationId xmlns:p14="http://schemas.microsoft.com/office/powerpoint/2010/main" xmlns="" val="2874016700"/>
       </p:ext>
     </p:extLst>
   </p:cSld>
   <p:clrMapOvr>
     <a:masterClrMapping/>
   </p:clrMapOvr>
-  <mc:AlternateContent xmlns:mc="http://schemas.openxmlformats.org/markup-compatibility/2006" xmlns:p14="http://schemas.microsoft.com/office/powerpoint/2010/main">
-    <mc:Choice Requires="p14">
+  <mc:AlternateContent xmlns:mc="http://schemas.openxmlformats.org/markup-compatibility/2006">
+    <mc:Choice xmlns:p14="http://schemas.microsoft.com/office/powerpoint/2010/main" xmlns="" Requires="p14">
       <p:transition p14:dur="0"/>
     </mc:Choice>
-    <mc:Fallback xmlns="">
+    <mc:Fallback>
       <p:transition/>
     </mc:Fallback>
   </mc:AlternateContent>
@@ -4044,7 +4044,6 @@
               <a:rPr lang="en-US" dirty="0" smtClean="0"/>
               <a:t>Declarative vs. Imperative</a:t>
             </a:r>
-            <a:endParaRPr lang="en-US" dirty="0" smtClean="0"/>
           </a:p>
           <a:p>
             <a:r>
@@ -4063,11 +4062,7 @@
           <a:p>
             <a:r>
               <a:rPr lang="en-US" dirty="0" smtClean="0"/>
-              <a:t>Ultimate </a:t>
-            </a:r>
-            <a:r>
-              <a:rPr lang="en-US" dirty="0" smtClean="0"/>
-              <a:t>goal: 3D </a:t>
+              <a:t>Ultimate goal: 3D </a:t>
             </a:r>
             <a:r>
               <a:rPr lang="en-US" dirty="0"/>
@@ -4182,18 +4177,18 @@
     </p:spTree>
     <p:extLst>
       <p:ext uri="{BB962C8B-B14F-4D97-AF65-F5344CB8AC3E}">
-        <p14:creationId xmlns:p14="http://schemas.microsoft.com/office/powerpoint/2010/main" val="18305828"/>
+        <p14:creationId xmlns:p14="http://schemas.microsoft.com/office/powerpoint/2010/main" xmlns="" val="18305828"/>
       </p:ext>
     </p:extLst>
   </p:cSld>
   <p:clrMapOvr>
     <a:masterClrMapping/>
   </p:clrMapOvr>
-  <mc:AlternateContent xmlns:mc="http://schemas.openxmlformats.org/markup-compatibility/2006" xmlns:p14="http://schemas.microsoft.com/office/powerpoint/2010/main">
-    <mc:Choice Requires="p14">
+  <mc:AlternateContent xmlns:mc="http://schemas.openxmlformats.org/markup-compatibility/2006">
+    <mc:Choice xmlns:p14="http://schemas.microsoft.com/office/powerpoint/2010/main" xmlns="" Requires="p14">
       <p:transition p14:dur="0"/>
     </mc:Choice>
-    <mc:Fallback xmlns="">
+    <mc:Fallback>
       <p:transition/>
     </mc:Fallback>
   </mc:AlternateContent>
@@ -4261,7 +4256,7 @@
           <a:blip r:embed="rId2">
             <a:extLst>
               <a:ext uri="{28A0092B-C50C-407E-A947-70E740481C1C}">
-                <a14:useLocalDpi xmlns:a14="http://schemas.microsoft.com/office/drawing/2010/main" val="0"/>
+                <a14:useLocalDpi xmlns:a14="http://schemas.microsoft.com/office/drawing/2010/main" xmlns="" val="0"/>
               </a:ext>
             </a:extLst>
           </a:blip>
@@ -4279,18 +4274,18 @@
     </p:spTree>
     <p:extLst>
       <p:ext uri="{BB962C8B-B14F-4D97-AF65-F5344CB8AC3E}">
-        <p14:creationId xmlns:p14="http://schemas.microsoft.com/office/powerpoint/2010/main" val="520086239"/>
+        <p14:creationId xmlns:p14="http://schemas.microsoft.com/office/powerpoint/2010/main" xmlns="" val="520086239"/>
       </p:ext>
     </p:extLst>
   </p:cSld>
   <p:clrMapOvr>
     <a:masterClrMapping/>
   </p:clrMapOvr>
-  <mc:AlternateContent xmlns:mc="http://schemas.openxmlformats.org/markup-compatibility/2006" xmlns:p14="http://schemas.microsoft.com/office/powerpoint/2010/main">
-    <mc:Choice Requires="p14">
+  <mc:AlternateContent xmlns:mc="http://schemas.openxmlformats.org/markup-compatibility/2006">
+    <mc:Choice xmlns:p14="http://schemas.microsoft.com/office/powerpoint/2010/main" xmlns="" Requires="p14">
       <p:transition p14:dur="0"/>
     </mc:Choice>
-    <mc:Fallback xmlns="">
+    <mc:Fallback>
       <p:transition/>
     </mc:Fallback>
   </mc:AlternateContent>
@@ -4453,18 +4448,18 @@
     </p:spTree>
     <p:extLst>
       <p:ext uri="{BB962C8B-B14F-4D97-AF65-F5344CB8AC3E}">
-        <p14:creationId xmlns:p14="http://schemas.microsoft.com/office/powerpoint/2010/main" val="3481554853"/>
+        <p14:creationId xmlns:p14="http://schemas.microsoft.com/office/powerpoint/2010/main" xmlns="" val="3481554853"/>
       </p:ext>
     </p:extLst>
   </p:cSld>
   <p:clrMapOvr>
     <a:masterClrMapping/>
   </p:clrMapOvr>
-  <mc:AlternateContent xmlns:mc="http://schemas.openxmlformats.org/markup-compatibility/2006" xmlns:p14="http://schemas.microsoft.com/office/powerpoint/2010/main">
-    <mc:Choice Requires="p14">
+  <mc:AlternateContent xmlns:mc="http://schemas.openxmlformats.org/markup-compatibility/2006">
+    <mc:Choice xmlns:p14="http://schemas.microsoft.com/office/powerpoint/2010/main" xmlns="" Requires="p14">
       <p:transition p14:dur="0"/>
     </mc:Choice>
-    <mc:Fallback xmlns="">
+    <mc:Fallback>
       <p:transition/>
     </mc:Fallback>
   </mc:AlternateContent>
@@ -4528,18 +4523,18 @@
     </p:spTree>
     <p:extLst>
       <p:ext uri="{BB962C8B-B14F-4D97-AF65-F5344CB8AC3E}">
-        <p14:creationId xmlns:p14="http://schemas.microsoft.com/office/powerpoint/2010/main" val="684588227"/>
+        <p14:creationId xmlns:p14="http://schemas.microsoft.com/office/powerpoint/2010/main" xmlns="" val="684588227"/>
       </p:ext>
     </p:extLst>
   </p:cSld>
   <p:clrMapOvr>
     <a:masterClrMapping/>
   </p:clrMapOvr>
-  <mc:AlternateContent xmlns:mc="http://schemas.openxmlformats.org/markup-compatibility/2006" xmlns:p14="http://schemas.microsoft.com/office/powerpoint/2010/main">
-    <mc:Choice Requires="p14">
+  <mc:AlternateContent xmlns:mc="http://schemas.openxmlformats.org/markup-compatibility/2006">
+    <mc:Choice xmlns:p14="http://schemas.microsoft.com/office/powerpoint/2010/main" xmlns="" Requires="p14">
       <p:transition p14:dur="0"/>
     </mc:Choice>
-    <mc:Fallback xmlns="">
+    <mc:Fallback>
       <p:transition/>
     </mc:Fallback>
   </mc:AlternateContent>
@@ -4719,18 +4714,18 @@
     </p:spTree>
     <p:extLst>
       <p:ext uri="{BB962C8B-B14F-4D97-AF65-F5344CB8AC3E}">
-        <p14:creationId xmlns:p14="http://schemas.microsoft.com/office/powerpoint/2010/main" val="2771929985"/>
+        <p14:creationId xmlns:p14="http://schemas.microsoft.com/office/powerpoint/2010/main" xmlns="" val="2771929985"/>
       </p:ext>
     </p:extLst>
   </p:cSld>
   <p:clrMapOvr>
     <a:masterClrMapping/>
   </p:clrMapOvr>
-  <mc:AlternateContent xmlns:mc="http://schemas.openxmlformats.org/markup-compatibility/2006" xmlns:p14="http://schemas.microsoft.com/office/powerpoint/2010/main">
-    <mc:Choice Requires="p14">
+  <mc:AlternateContent xmlns:mc="http://schemas.openxmlformats.org/markup-compatibility/2006">
+    <mc:Choice xmlns:p14="http://schemas.microsoft.com/office/powerpoint/2010/main" xmlns="" Requires="p14">
       <p:transition p14:dur="0"/>
     </mc:Choice>
-    <mc:Fallback xmlns="">
+    <mc:Fallback>
       <p:transition/>
     </mc:Fallback>
   </mc:AlternateContent>
@@ -5250,18 +5245,18 @@
     </p:spTree>
     <p:extLst>
       <p:ext uri="{BB962C8B-B14F-4D97-AF65-F5344CB8AC3E}">
-        <p14:creationId xmlns:p14="http://schemas.microsoft.com/office/powerpoint/2010/main" val="3997840176"/>
+        <p14:creationId xmlns:p14="http://schemas.microsoft.com/office/powerpoint/2010/main" xmlns="" val="3997840176"/>
       </p:ext>
     </p:extLst>
   </p:cSld>
   <p:clrMapOvr>
     <a:masterClrMapping/>
   </p:clrMapOvr>
-  <mc:AlternateContent xmlns:mc="http://schemas.openxmlformats.org/markup-compatibility/2006" xmlns:p14="http://schemas.microsoft.com/office/powerpoint/2010/main">
-    <mc:Choice Requires="p14">
+  <mc:AlternateContent xmlns:mc="http://schemas.openxmlformats.org/markup-compatibility/2006">
+    <mc:Choice xmlns:p14="http://schemas.microsoft.com/office/powerpoint/2010/main" xmlns="" Requires="p14">
       <p:transition p14:dur="0"/>
     </mc:Choice>
-    <mc:Fallback xmlns="">
+    <mc:Fallback>
       <p:transition/>
     </mc:Fallback>
   </mc:AlternateContent>
@@ -5363,14 +5358,55 @@
             <a:pPr lvl="1"/>
             <a:r>
               <a:rPr lang="en-US" dirty="0" smtClean="0"/>
-              <a:t>...</a:t>
-            </a:r>
+              <a:t>Designed from scratch</a:t>
+            </a:r>
+            <a:endParaRPr lang="en-US" dirty="0" smtClean="0"/>
           </a:p>
           <a:p>
             <a:pPr lvl="1"/>
             <a:r>
               <a:rPr lang="en-US" dirty="0" smtClean="0"/>
-              <a:t>...</a:t>
+              <a:t>Integrated dataflow concept (</a:t>
+            </a:r>
+            <a:r>
+              <a:rPr lang="en-US" dirty="0" err="1" smtClean="0"/>
+              <a:t>Xflow</a:t>
+            </a:r>
+            <a:r>
+              <a:rPr lang="en-US" dirty="0" smtClean="0"/>
+              <a:t>)</a:t>
+            </a:r>
+          </a:p>
+          <a:p>
+            <a:pPr lvl="2"/>
+            <a:r>
+              <a:rPr lang="en-US" dirty="0" smtClean="0"/>
+              <a:t>Skeleton animation, Image Processing, Augmented Reality</a:t>
+            </a:r>
+          </a:p>
+          <a:p>
+            <a:pPr lvl="2"/>
+            <a:r>
+              <a:rPr lang="en-US" dirty="0" smtClean="0"/>
+              <a:t>Can be mapped to HW (GPU, River Trail, </a:t>
+            </a:r>
+            <a:r>
+              <a:rPr lang="en-US" dirty="0" err="1" smtClean="0"/>
+              <a:t>WebCL</a:t>
+            </a:r>
+            <a:r>
+              <a:rPr lang="en-US" dirty="0" smtClean="0"/>
+              <a:t>?)</a:t>
+            </a:r>
+          </a:p>
+          <a:p>
+            <a:r>
+              <a:rPr lang="en-US" dirty="0" smtClean="0"/>
+              <a:t>Both platforms OSS and freely available on </a:t>
+            </a:r>
+            <a:r>
+              <a:rPr lang="en-US" dirty="0" err="1" smtClean="0"/>
+              <a:t>GitHub</a:t>
             </a:r>
             <a:endParaRPr lang="en-US" dirty="0"/>
           </a:p>
@@ -5379,18 +5415,18 @@
     </p:spTree>
     <p:extLst>
       <p:ext uri="{BB962C8B-B14F-4D97-AF65-F5344CB8AC3E}">
-        <p14:creationId xmlns:p14="http://schemas.microsoft.com/office/powerpoint/2010/main" val="1869452409"/>
+        <p14:creationId xmlns:p14="http://schemas.microsoft.com/office/powerpoint/2010/main" xmlns="" val="1869452409"/>
       </p:ext>
     </p:extLst>
   </p:cSld>
   <p:clrMapOvr>
     <a:masterClrMapping/>
   </p:clrMapOvr>
-  <mc:AlternateContent xmlns:mc="http://schemas.openxmlformats.org/markup-compatibility/2006" xmlns:p14="http://schemas.microsoft.com/office/powerpoint/2010/main">
-    <mc:Choice Requires="p14">
+  <mc:AlternateContent xmlns:mc="http://schemas.openxmlformats.org/markup-compatibility/2006">
+    <mc:Choice xmlns:p14="http://schemas.microsoft.com/office/powerpoint/2010/main" xmlns="" Requires="p14">
       <p:transition p14:dur="0"/>
     </mc:Choice>
-    <mc:Fallback xmlns="">
+    <mc:Fallback>
       <p:transition/>
     </mc:Fallback>
   </mc:AlternateContent>
@@ -5459,32 +5495,222 @@
           <a:lstStyle/>
           <a:p>
             <a:r>
-              <a:rPr lang="en-US" dirty="0"/>
-              <a:t>15 key </a:t>
-            </a:r>
-            <a:r>
-              <a:rPr lang="en-US" dirty="0" smtClean="0"/>
-              <a:t>concepts ...</a:t>
-            </a:r>
+              <a:rPr lang="en-US" dirty="0" smtClean="0"/>
+              <a:t>Extracted 15 essentials for HTML/DOM-based 3D graphics</a:t>
+            </a:r>
+          </a:p>
+          <a:p>
+            <a:r>
+              <a:rPr lang="en-US" dirty="0" smtClean="0"/>
+              <a:t>For instance: </a:t>
+            </a:r>
+          </a:p>
+          <a:p>
+            <a:pPr lvl="1"/>
+            <a:r>
+              <a:rPr lang="en-US" dirty="0" smtClean="0"/>
+              <a:t>Use CSS 3D Transforms for transformations</a:t>
+            </a:r>
+          </a:p>
+          <a:p>
+            <a:endParaRPr lang="en-US" dirty="0" smtClean="0"/>
+          </a:p>
+          <a:p>
+            <a:endParaRPr lang="en-US" dirty="0" smtClean="0"/>
+          </a:p>
+          <a:p>
+            <a:endParaRPr lang="en-US" dirty="0" smtClean="0"/>
+          </a:p>
+          <a:p>
+            <a:endParaRPr lang="en-US" dirty="0" smtClean="0"/>
+          </a:p>
+          <a:p>
+            <a:endParaRPr lang="en-US" dirty="0" smtClean="0"/>
+          </a:p>
+          <a:p>
+            <a:endParaRPr lang="en-US" dirty="0" smtClean="0"/>
+          </a:p>
+          <a:p>
+            <a:r>
+              <a:rPr lang="en-US" dirty="0" smtClean="0"/>
+              <a:t>How tight can we integrate 3D with web technology?</a:t>
+            </a:r>
+          </a:p>
+          <a:p>
+            <a:endParaRPr lang="en-US" dirty="0" smtClean="0"/>
+          </a:p>
+          <a:p>
+            <a:endParaRPr lang="en-US" dirty="0" smtClean="0"/>
+          </a:p>
+          <a:p>
+            <a:endParaRPr lang="en-US" dirty="0" smtClean="0"/>
+          </a:p>
+          <a:p>
+            <a:endParaRPr lang="en-US" dirty="0" smtClean="0"/>
+          </a:p>
+          <a:p>
+            <a:endParaRPr lang="en-US" dirty="0" smtClean="0"/>
+          </a:p>
+          <a:p>
+            <a:endParaRPr lang="en-US" dirty="0" smtClean="0"/>
+          </a:p>
+          <a:p>
+            <a:endParaRPr lang="en-US" dirty="0" smtClean="0"/>
+          </a:p>
+          <a:p>
+            <a:pPr>
+              <a:buNone/>
+            </a:pPr>
+            <a:endParaRPr lang="en-US" dirty="0" smtClean="0"/>
+          </a:p>
+          <a:p>
+            <a:pPr lvl="1"/>
             <a:endParaRPr lang="en-US" dirty="0"/>
+          </a:p>
+        </p:txBody>
+      </p:sp>
+      <p:sp>
+        <p:nvSpPr>
+          <p:cNvPr id="4" name="Textfeld 3"/>
+          <p:cNvSpPr txBox="1"/>
+          <p:nvPr/>
+        </p:nvSpPr>
+        <p:spPr>
+          <a:xfrm>
+            <a:off x="1310192" y="3016156"/>
+            <a:ext cx="6136616" cy="2031325"/>
+          </a:xfrm>
+          <a:prstGeom prst="rect">
+            <a:avLst/>
+          </a:prstGeom>
+          <a:noFill/>
+        </p:spPr>
+        <p:txBody>
+          <a:bodyPr wrap="none" rtlCol="0">
+            <a:spAutoFit/>
+          </a:bodyPr>
+          <a:lstStyle/>
+          <a:p>
+            <a:r>
+              <a:rPr lang="en-US" dirty="0" smtClean="0">
+                <a:latin typeface="Consolas" pitchFamily="49" charset="0"/>
+              </a:rPr>
+              <a:t>&lt;div&gt;</a:t>
+            </a:r>
+          </a:p>
+          <a:p>
+            <a:r>
+              <a:rPr lang="en-US" dirty="0" smtClean="0">
+                <a:latin typeface="Consolas" pitchFamily="49" charset="0"/>
+              </a:rPr>
+              <a:t>   &lt;</a:t>
+            </a:r>
+            <a:r>
+              <a:rPr lang="en-US" dirty="0" smtClean="0">
+                <a:latin typeface="Consolas" pitchFamily="49" charset="0"/>
+              </a:rPr>
+              <a:t>dec3d style="border: 1px solid black;"&gt;</a:t>
+            </a:r>
+          </a:p>
+          <a:p>
+            <a:r>
+              <a:rPr lang="fr-FR" dirty="0" smtClean="0">
+                <a:latin typeface="Consolas" pitchFamily="49" charset="0"/>
+              </a:rPr>
+              <a:t>     &lt;</a:t>
+            </a:r>
+            <a:r>
+              <a:rPr lang="fr-FR" dirty="0" err="1" smtClean="0">
+                <a:latin typeface="Consolas" pitchFamily="49" charset="0"/>
+              </a:rPr>
+              <a:t>div</a:t>
+            </a:r>
+            <a:r>
+              <a:rPr lang="fr-FR" dirty="0" smtClean="0">
+                <a:latin typeface="Consolas" pitchFamily="49" charset="0"/>
+              </a:rPr>
+              <a:t> style="</a:t>
+            </a:r>
+            <a:r>
+              <a:rPr lang="fr-FR" dirty="0" err="1" smtClean="0">
+                <a:latin typeface="Consolas" pitchFamily="49" charset="0"/>
+              </a:rPr>
+              <a:t>transform</a:t>
+            </a:r>
+            <a:r>
+              <a:rPr lang="fr-FR" dirty="0" smtClean="0">
+                <a:latin typeface="Consolas" pitchFamily="49" charset="0"/>
+              </a:rPr>
+              <a:t>: scale3d(2, 2, 2);"&gt;</a:t>
+            </a:r>
+          </a:p>
+          <a:p>
+            <a:r>
+              <a:rPr lang="en-US" dirty="0" smtClean="0">
+                <a:latin typeface="Consolas" pitchFamily="49" charset="0"/>
+              </a:rPr>
+              <a:t>        ...</a:t>
+            </a:r>
+            <a:endParaRPr lang="en-US" dirty="0" smtClean="0">
+              <a:latin typeface="Consolas" pitchFamily="49" charset="0"/>
+            </a:endParaRPr>
+          </a:p>
+          <a:p>
+            <a:r>
+              <a:rPr lang="en-US" dirty="0" smtClean="0">
+                <a:latin typeface="Consolas" pitchFamily="49" charset="0"/>
+              </a:rPr>
+              <a:t>     &lt;/</a:t>
+            </a:r>
+            <a:r>
+              <a:rPr lang="en-US" dirty="0" smtClean="0">
+                <a:latin typeface="Consolas" pitchFamily="49" charset="0"/>
+              </a:rPr>
+              <a:t>div&gt;</a:t>
+            </a:r>
+          </a:p>
+          <a:p>
+            <a:r>
+              <a:rPr lang="en-US" dirty="0" smtClean="0">
+                <a:latin typeface="Consolas" pitchFamily="49" charset="0"/>
+              </a:rPr>
+              <a:t>   &lt;/</a:t>
+            </a:r>
+            <a:r>
+              <a:rPr lang="en-US" dirty="0" smtClean="0">
+                <a:latin typeface="Consolas" pitchFamily="49" charset="0"/>
+              </a:rPr>
+              <a:t>dec3d&gt;</a:t>
+            </a:r>
+          </a:p>
+          <a:p>
+            <a:r>
+              <a:rPr lang="en-US" dirty="0" smtClean="0">
+                <a:latin typeface="Consolas" pitchFamily="49" charset="0"/>
+              </a:rPr>
+              <a:t>&lt;/div&gt;</a:t>
+            </a:r>
+            <a:endParaRPr lang="en-US" dirty="0">
+              <a:latin typeface="Consolas" pitchFamily="49" charset="0"/>
+            </a:endParaRPr>
           </a:p>
         </p:txBody>
       </p:sp>
     </p:spTree>
     <p:extLst>
       <p:ext uri="{BB962C8B-B14F-4D97-AF65-F5344CB8AC3E}">
-        <p14:creationId xmlns:p14="http://schemas.microsoft.com/office/powerpoint/2010/main" val="2220943333"/>
+        <p14:creationId xmlns:p14="http://schemas.microsoft.com/office/powerpoint/2010/main" xmlns="" val="2220943333"/>
       </p:ext>
     </p:extLst>
   </p:cSld>
   <p:clrMapOvr>
     <a:masterClrMapping/>
   </p:clrMapOvr>
-  <mc:AlternateContent xmlns:mc="http://schemas.openxmlformats.org/markup-compatibility/2006" xmlns:p14="http://schemas.microsoft.com/office/powerpoint/2010/main">
-    <mc:Choice Requires="p14">
+  <mc:AlternateContent xmlns:mc="http://schemas.openxmlformats.org/markup-compatibility/2006">
+    <mc:Choice xmlns:p14="http://schemas.microsoft.com/office/powerpoint/2010/main" xmlns="" Requires="p14">
       <p:transition p14:dur="0"/>
     </mc:Choice>
-    <mc:Fallback xmlns="">
+    <mc:Fallback>
       <p:transition/>
     </mc:Fallback>
   </mc:AlternateContent>
@@ -5670,7 +5896,7 @@
           <a:blip r:embed="rId3">
             <a:extLst>
               <a:ext uri="{28A0092B-C50C-407E-A947-70E740481C1C}">
-                <a14:useLocalDpi xmlns:a14="http://schemas.microsoft.com/office/drawing/2010/main" val="0"/>
+                <a14:useLocalDpi xmlns:a14="http://schemas.microsoft.com/office/drawing/2010/main" xmlns="" val="0"/>
               </a:ext>
             </a:extLst>
           </a:blip>
@@ -5691,7 +5917,7 @@
     </p:spTree>
     <p:extLst>
       <p:ext uri="{BB962C8B-B14F-4D97-AF65-F5344CB8AC3E}">
-        <p14:creationId xmlns:p14="http://schemas.microsoft.com/office/powerpoint/2010/main" val="2909472201"/>
+        <p14:creationId xmlns:p14="http://schemas.microsoft.com/office/powerpoint/2010/main" xmlns="" val="2909472201"/>
       </p:ext>
     </p:extLst>
   </p:cSld>
@@ -5699,7 +5925,7 @@
     <a:masterClrMapping/>
   </p:clrMapOvr>
   <mc:AlternateContent xmlns:mc="http://schemas.openxmlformats.org/markup-compatibility/2006">
-    <mc:Choice xmlns:p14="http://schemas.microsoft.com/office/powerpoint/2010/main" Requires="p14">
+    <mc:Choice xmlns:p14="http://schemas.microsoft.com/office/powerpoint/2010/main" xmlns="" Requires="p14">
       <p:transition p14:dur="10"/>
     </mc:Choice>
     <mc:Fallback>
@@ -5967,7 +6193,7 @@
   <a:extraClrSchemeLst/>
   <a:extLst>
     <a:ext uri="{05A4C25C-085E-4340-85A3-A5531E510DB2}">
-      <thm15:themeFamily xmlns:thm15="http://schemas.microsoft.com/office/thememl/2012/main" name="STAR" id="{337B15D5-31BB-4D98-9693-879717AF7C82}" vid="{D4FEF77D-C77F-4540-B21B-D1F1542CE16D}"/>
+      <thm15:themeFamily xmlns:thm15="http://schemas.microsoft.com/office/thememl/2012/main" xmlns="" name="STAR" id="{337B15D5-31BB-4D98-9693-879717AF7C82}" vid="{D4FEF77D-C77F-4540-B21B-D1F1542CE16D}"/>
     </a:ext>
   </a:extLst>
 </a:theme>
@@ -6228,7 +6454,7 @@
   <a:extraClrSchemeLst/>
   <a:extLst>
     <a:ext uri="{05A4C25C-085E-4340-85A3-A5531E510DB2}">
-      <thm15:themeFamily xmlns:thm15="http://schemas.microsoft.com/office/thememl/2012/main" name="Office Theme" id="{62F939B6-93AF-4DB8-9C6B-D6C7DFDC589F}" vid="{4A3C46E8-61CC-4603-A589-7422A47A8E4A}"/>
+      <thm15:themeFamily xmlns:thm15="http://schemas.microsoft.com/office/thememl/2012/main" xmlns="" name="Office Theme" id="{62F939B6-93AF-4DB8-9C6B-D6C7DFDC589F}" vid="{4A3C46E8-61CC-4603-A589-7422A47A8E4A}"/>
     </a:ext>
   </a:extLst>
 </a:theme>
@@ -6489,7 +6715,7 @@
   <a:extraClrSchemeLst/>
   <a:extLst>
     <a:ext uri="{05A4C25C-085E-4340-85A3-A5531E510DB2}">
-      <thm15:themeFamily xmlns:thm15="http://schemas.microsoft.com/office/thememl/2012/main" name="Office Theme" id="{62F939B6-93AF-4DB8-9C6B-D6C7DFDC589F}" vid="{4A3C46E8-61CC-4603-A589-7422A47A8E4A}"/>
+      <thm15:themeFamily xmlns:thm15="http://schemas.microsoft.com/office/thememl/2012/main" xmlns="" name="Office Theme" id="{62F939B6-93AF-4DB8-9C6B-D6C7DFDC589F}" vid="{4A3C46E8-61CC-4603-A589-7422A47A8E4A}"/>
     </a:ext>
   </a:extLst>
 </a:theme>

</xml_diff>